<commit_message>
Alteração na apresentação do 2º seminário
</commit_message>
<xml_diff>
--- a/Documentação/2º Seminário/2º Seminário.pptx
+++ b/Documentação/2º Seminário/2º Seminário.pptx
@@ -16,15 +16,16 @@
     <p:sldId id="277" r:id="rId10"/>
     <p:sldId id="281" r:id="rId11"/>
     <p:sldId id="279" r:id="rId12"/>
-    <p:sldId id="282" r:id="rId13"/>
-    <p:sldId id="283" r:id="rId14"/>
-    <p:sldId id="284" r:id="rId15"/>
-    <p:sldId id="285" r:id="rId16"/>
-    <p:sldId id="286" r:id="rId17"/>
-    <p:sldId id="268" r:id="rId18"/>
-    <p:sldId id="269" r:id="rId19"/>
-    <p:sldId id="280" r:id="rId20"/>
-    <p:sldId id="273" r:id="rId21"/>
+    <p:sldId id="287" r:id="rId13"/>
+    <p:sldId id="282" r:id="rId14"/>
+    <p:sldId id="283" r:id="rId15"/>
+    <p:sldId id="284" r:id="rId16"/>
+    <p:sldId id="285" r:id="rId17"/>
+    <p:sldId id="286" r:id="rId18"/>
+    <p:sldId id="268" r:id="rId19"/>
+    <p:sldId id="269" r:id="rId20"/>
+    <p:sldId id="280" r:id="rId21"/>
+    <p:sldId id="273" r:id="rId22"/>
   </p:sldIdLst>
   <p:sldSz cx="12192000" cy="6858000"/>
   <p:notesSz cx="6858000" cy="9144000"/>
@@ -125,7 +126,18 @@
   </p:defaultTextStyle>
   <p:extLst>
     <p:ext uri="{EFAFB233-063F-42B5-8137-9DF3F51BA10A}">
-      <p15:sldGuideLst xmlns="" xmlns:p15="http://schemas.microsoft.com/office/powerpoint/2012/main"/>
+      <p15:sldGuideLst xmlns:p15="http://schemas.microsoft.com/office/powerpoint/2012/main">
+        <p15:guide id="1" orient="horz" pos="2160">
+          <p15:clr>
+            <a:srgbClr val="A4A3A4"/>
+          </p15:clr>
+        </p15:guide>
+        <p15:guide id="2" pos="3840">
+          <p15:clr>
+            <a:srgbClr val="A4A3A4"/>
+          </p15:clr>
+        </p15:guide>
+      </p15:sldGuideLst>
     </p:ext>
   </p:extLst>
 </p:presentation>
@@ -854,7 +866,7 @@
             <a:fld id="{B61BEF0D-F0BB-DE4B-95CE-6DB70DBA9567}" type="datetimeFigureOut">
               <a:rPr lang="en-US" dirty="0"/>
               <a:pPr/>
-              <a:t>10/22/2014</a:t>
+              <a:t>10/23/2014</a:t>
             </a:fld>
             <a:endParaRPr lang="en-US" dirty="0"/>
           </a:p>
@@ -1102,7 +1114,7 @@
             <a:fld id="{B61BEF0D-F0BB-DE4B-95CE-6DB70DBA9567}" type="datetimeFigureOut">
               <a:rPr lang="en-US" dirty="0"/>
               <a:pPr/>
-              <a:t>10/22/2014</a:t>
+              <a:t>10/23/2014</a:t>
             </a:fld>
             <a:endParaRPr lang="en-US" dirty="0"/>
           </a:p>
@@ -1413,7 +1425,7 @@
             <a:fld id="{B61BEF0D-F0BB-DE4B-95CE-6DB70DBA9567}" type="datetimeFigureOut">
               <a:rPr lang="en-US" dirty="0"/>
               <a:pPr/>
-              <a:t>10/22/2014</a:t>
+              <a:t>10/23/2014</a:t>
             </a:fld>
             <a:endParaRPr lang="en-US" dirty="0"/>
           </a:p>
@@ -1751,7 +1763,7 @@
             <a:fld id="{B61BEF0D-F0BB-DE4B-95CE-6DB70DBA9567}" type="datetimeFigureOut">
               <a:rPr lang="en-US" dirty="0"/>
               <a:pPr/>
-              <a:t>10/22/2014</a:t>
+              <a:t>10/23/2014</a:t>
             </a:fld>
             <a:endParaRPr lang="en-US" dirty="0"/>
           </a:p>
@@ -2062,7 +2074,7 @@
             <a:fld id="{B61BEF0D-F0BB-DE4B-95CE-6DB70DBA9567}" type="datetimeFigureOut">
               <a:rPr lang="en-US" dirty="0"/>
               <a:pPr/>
-              <a:t>10/22/2014</a:t>
+              <a:t>10/23/2014</a:t>
             </a:fld>
             <a:endParaRPr lang="en-US" dirty="0"/>
           </a:p>
@@ -2452,7 +2464,7 @@
             <a:fld id="{B61BEF0D-F0BB-DE4B-95CE-6DB70DBA9567}" type="datetimeFigureOut">
               <a:rPr lang="en-US" dirty="0"/>
               <a:pPr/>
-              <a:t>10/22/2014</a:t>
+              <a:t>10/23/2014</a:t>
             </a:fld>
             <a:endParaRPr lang="en-US" dirty="0"/>
           </a:p>
@@ -2619,7 +2631,7 @@
             <a:fld id="{55C6B4A9-1611-4792-9094-5F34BCA07E0B}" type="datetimeFigureOut">
               <a:rPr lang="en-US" dirty="0"/>
               <a:pPr/>
-              <a:t>10/22/2014</a:t>
+              <a:t>10/23/2014</a:t>
             </a:fld>
             <a:endParaRPr lang="en-US" dirty="0"/>
           </a:p>
@@ -2796,7 +2808,7 @@
             <a:fld id="{B61BEF0D-F0BB-DE4B-95CE-6DB70DBA9567}" type="datetimeFigureOut">
               <a:rPr lang="en-US" dirty="0"/>
               <a:pPr/>
-              <a:t>10/22/2014</a:t>
+              <a:t>10/23/2014</a:t>
             </a:fld>
             <a:endParaRPr lang="en-US" dirty="0"/>
           </a:p>
@@ -2969,7 +2981,7 @@
             <a:fld id="{B61BEF0D-F0BB-DE4B-95CE-6DB70DBA9567}" type="datetimeFigureOut">
               <a:rPr lang="en-US" dirty="0"/>
               <a:pPr/>
-              <a:t>10/22/2014</a:t>
+              <a:t>10/23/2014</a:t>
             </a:fld>
             <a:endParaRPr lang="en-US" dirty="0"/>
           </a:p>
@@ -3213,7 +3225,7 @@
             <a:fld id="{B61BEF0D-F0BB-DE4B-95CE-6DB70DBA9567}" type="datetimeFigureOut">
               <a:rPr lang="en-US" dirty="0"/>
               <a:pPr/>
-              <a:t>10/22/2014</a:t>
+              <a:t>10/23/2014</a:t>
             </a:fld>
             <a:endParaRPr lang="en-US" dirty="0"/>
           </a:p>
@@ -3442,7 +3454,7 @@
             <a:fld id="{EB712588-04B1-427B-82EE-E8DB90309F08}" type="datetimeFigureOut">
               <a:rPr lang="en-US" dirty="0"/>
               <a:pPr/>
-              <a:t>10/22/2014</a:t>
+              <a:t>10/23/2014</a:t>
             </a:fld>
             <a:endParaRPr lang="en-US" dirty="0"/>
           </a:p>
@@ -3813,7 +3825,7 @@
             <a:fld id="{B61BEF0D-F0BB-DE4B-95CE-6DB70DBA9567}" type="datetimeFigureOut">
               <a:rPr lang="en-US" dirty="0"/>
               <a:pPr/>
-              <a:t>10/22/2014</a:t>
+              <a:t>10/23/2014</a:t>
             </a:fld>
             <a:endParaRPr lang="en-US" dirty="0"/>
           </a:p>
@@ -3933,7 +3945,7 @@
             <a:fld id="{B61BEF0D-F0BB-DE4B-95CE-6DB70DBA9567}" type="datetimeFigureOut">
               <a:rPr lang="en-US" dirty="0"/>
               <a:pPr/>
-              <a:t>10/22/2014</a:t>
+              <a:t>10/23/2014</a:t>
             </a:fld>
             <a:endParaRPr lang="en-US" dirty="0"/>
           </a:p>
@@ -4025,7 +4037,7 @@
             <a:fld id="{B61BEF0D-F0BB-DE4B-95CE-6DB70DBA9567}" type="datetimeFigureOut">
               <a:rPr lang="en-US" dirty="0"/>
               <a:pPr/>
-              <a:t>10/22/2014</a:t>
+              <a:t>10/23/2014</a:t>
             </a:fld>
             <a:endParaRPr lang="en-US" dirty="0"/>
           </a:p>
@@ -4277,7 +4289,7 @@
             <a:fld id="{42A54C80-263E-416B-A8E0-580EDEADCBDC}" type="datetimeFigureOut">
               <a:rPr lang="en-US" dirty="0"/>
               <a:pPr/>
-              <a:t>10/22/2014</a:t>
+              <a:t>10/23/2014</a:t>
             </a:fld>
             <a:endParaRPr lang="en-US" dirty="0"/>
           </a:p>
@@ -4537,7 +4549,7 @@
             <a:fld id="{B61BEF0D-F0BB-DE4B-95CE-6DB70DBA9567}" type="datetimeFigureOut">
               <a:rPr lang="en-US" dirty="0"/>
               <a:pPr/>
-              <a:t>10/22/2014</a:t>
+              <a:t>10/23/2014</a:t>
             </a:fld>
             <a:endParaRPr lang="en-US" dirty="0"/>
           </a:p>
@@ -5277,7 +5289,7 @@
             <a:fld id="{B61BEF0D-F0BB-DE4B-95CE-6DB70DBA9567}" type="datetimeFigureOut">
               <a:rPr lang="en-US" dirty="0"/>
               <a:pPr/>
-              <a:t>10/22/2014</a:t>
+              <a:t>10/23/2014</a:t>
             </a:fld>
             <a:endParaRPr lang="en-US" dirty="0"/>
           </a:p>
@@ -5819,11 +5831,7 @@
           <a:p>
             <a:r>
               <a:rPr lang="pt-BR" dirty="0" smtClean="0"/>
-              <a:t>2º </a:t>
-            </a:r>
-            <a:r>
-              <a:rPr lang="pt-BR" dirty="0" smtClean="0"/>
-              <a:t>Seminário</a:t>
+              <a:t>2º Seminário</a:t>
             </a:r>
             <a:br>
               <a:rPr lang="pt-BR" dirty="0" smtClean="0"/>
@@ -5874,7 +5882,7 @@
     </p:spTree>
     <p:extLst>
       <p:ext uri="{BB962C8B-B14F-4D97-AF65-F5344CB8AC3E}">
-        <p14:creationId xmlns="" xmlns:p14="http://schemas.microsoft.com/office/powerpoint/2010/main" val="1688627869"/>
+        <p14:creationId xmlns:p14="http://schemas.microsoft.com/office/powerpoint/2010/main" val="1688627869"/>
       </p:ext>
     </p:extLst>
   </p:cSld>
@@ -6012,7 +6020,7 @@
     </p:spTree>
     <p:extLst>
       <p:ext uri="{BB962C8B-B14F-4D97-AF65-F5344CB8AC3E}">
-        <p14:creationId xmlns="" xmlns:p14="http://schemas.microsoft.com/office/powerpoint/2010/main" val="1757591799"/>
+        <p14:creationId xmlns:p14="http://schemas.microsoft.com/office/powerpoint/2010/main" val="1757591799"/>
       </p:ext>
     </p:extLst>
   </p:cSld>
@@ -6114,47 +6122,26 @@
             <a:pPr lvl="2"/>
             <a:r>
               <a:rPr lang="pt-BR" sz="2600" dirty="0" smtClean="0"/>
-              <a:t>Simplificação de tarefas complexas</a:t>
+              <a:t>Simplificação de tarefas </a:t>
+            </a:r>
+            <a:r>
+              <a:rPr lang="pt-BR" sz="2600" dirty="0" smtClean="0"/>
+              <a:t>complexas</a:t>
             </a:r>
           </a:p>
           <a:p>
             <a:pPr lvl="1"/>
-            <a:r>
-              <a:rPr lang="pt-BR" sz="2800" dirty="0" smtClean="0"/>
-              <a:t>Erro na estimativa</a:t>
-            </a:r>
-          </a:p>
-          <a:p>
-            <a:pPr lvl="2"/>
-            <a:r>
-              <a:rPr lang="pt-BR" sz="2600" dirty="0" smtClean="0"/>
-              <a:t>Musicas: Estimado 2Horas, Real 6h30</a:t>
-            </a:r>
-          </a:p>
-          <a:p>
-            <a:pPr lvl="2"/>
-            <a:r>
-              <a:rPr lang="pt-BR" sz="2600" dirty="0" smtClean="0"/>
-              <a:t>Tarefas não estimadas: Revisões</a:t>
-            </a:r>
-            <a:r>
-              <a:rPr lang="pt-BR" sz="2600" dirty="0" smtClean="0"/>
-              <a:t>, </a:t>
-            </a:r>
-            <a:r>
-              <a:rPr lang="pt-BR" sz="2600" dirty="0" err="1" smtClean="0"/>
-              <a:t>Pair</a:t>
-            </a:r>
-            <a:r>
-              <a:rPr lang="pt-BR" sz="2600" dirty="0" smtClean="0"/>
-              <a:t> Programming, telas do jogo.</a:t>
-            </a:r>
+            <a:endParaRPr lang="pt-BR" sz="3000" dirty="0" smtClean="0"/>
           </a:p>
           <a:p>
             <a:pPr lvl="1"/>
             <a:r>
-              <a:rPr lang="pt-BR" sz="2800" dirty="0" smtClean="0"/>
-              <a:t>Curva de aprendizado</a:t>
+              <a:rPr lang="pt-BR" sz="3000" dirty="0" smtClean="0"/>
+              <a:t>Curva </a:t>
+            </a:r>
+            <a:r>
+              <a:rPr lang="pt-BR" sz="3000" dirty="0" smtClean="0"/>
+              <a:t>de aprendizado</a:t>
             </a:r>
           </a:p>
           <a:p>
@@ -6170,7 +6157,7 @@
     </p:spTree>
     <p:extLst>
       <p:ext uri="{BB962C8B-B14F-4D97-AF65-F5344CB8AC3E}">
-        <p14:creationId xmlns="" xmlns:p14="http://schemas.microsoft.com/office/powerpoint/2010/main" val="1757591799"/>
+        <p14:creationId xmlns:p14="http://schemas.microsoft.com/office/powerpoint/2010/main" val="1757591799"/>
       </p:ext>
     </p:extLst>
   </p:cSld>
@@ -6214,27 +6201,14 @@
             <p:ph type="title"/>
           </p:nvPr>
         </p:nvSpPr>
-        <p:spPr>
-          <a:xfrm>
-            <a:off x="677334" y="609600"/>
-            <a:ext cx="8596668" cy="799475"/>
-          </a:xfrm>
-        </p:spPr>
+        <p:spPr/>
         <p:txBody>
           <a:bodyPr/>
           <a:lstStyle/>
           <a:p>
             <a:r>
-              <a:rPr lang="pt-BR" dirty="0" err="1" smtClean="0"/>
-              <a:t>Burn</a:t>
-            </a:r>
-            <a:r>
               <a:rPr lang="pt-BR" dirty="0" smtClean="0"/>
-              <a:t> </a:t>
-            </a:r>
-            <a:r>
-              <a:rPr lang="pt-BR" dirty="0" err="1" smtClean="0"/>
-              <a:t>Down</a:t>
+              <a:t>Dificuldades Encontradas	</a:t>
             </a:r>
             <a:endParaRPr lang="pt-BR" dirty="0"/>
           </a:p>
@@ -6263,65 +6237,74 @@
           <a:lstStyle/>
           <a:p>
             <a:r>
-              <a:rPr lang="pt-BR" sz="3000" dirty="0" err="1" smtClean="0"/>
-              <a:t>Sprint</a:t>
-            </a:r>
-            <a:r>
               <a:rPr lang="pt-BR" sz="3000" dirty="0" smtClean="0"/>
-              <a:t> 1</a:t>
-            </a:r>
+              <a:t>Desenvolvimento</a:t>
+            </a:r>
+            <a:endParaRPr lang="pt-BR" sz="3000" dirty="0" smtClean="0"/>
           </a:p>
           <a:p>
             <a:pPr lvl="1"/>
             <a:r>
               <a:rPr lang="pt-BR" sz="2800" dirty="0" smtClean="0"/>
-              <a:t>Faltou </a:t>
-            </a:r>
-            <a:r>
-              <a:rPr lang="pt-BR" sz="2800" dirty="0" err="1" smtClean="0"/>
-              <a:t>Estrátegias</a:t>
+              <a:t>Erro </a:t>
             </a:r>
             <a:r>
               <a:rPr lang="pt-BR" sz="2800" dirty="0" smtClean="0"/>
-              <a:t> IA.</a:t>
-            </a:r>
+              <a:t>na estimativa</a:t>
+            </a:r>
+          </a:p>
+          <a:p>
+            <a:pPr lvl="2"/>
+            <a:r>
+              <a:rPr lang="pt-BR" sz="2600" dirty="0" smtClean="0"/>
+              <a:t>Musicas: Estimado 2Horas, Real 6h30</a:t>
+            </a:r>
+          </a:p>
+          <a:p>
+            <a:pPr lvl="2"/>
+            <a:r>
+              <a:rPr lang="pt-BR" sz="2600" dirty="0" smtClean="0"/>
+              <a:t>Tarefas não estimadas: Revisões, </a:t>
+            </a:r>
+            <a:r>
+              <a:rPr lang="pt-BR" sz="2600" dirty="0" err="1" smtClean="0"/>
+              <a:t>Pair</a:t>
+            </a:r>
+            <a:r>
+              <a:rPr lang="pt-BR" sz="2600" dirty="0" smtClean="0"/>
+              <a:t> Programming, telas do jogo</a:t>
+            </a:r>
+            <a:r>
+              <a:rPr lang="pt-BR" sz="2600" dirty="0" smtClean="0"/>
+              <a:t>.</a:t>
+            </a:r>
+          </a:p>
+          <a:p>
+            <a:pPr lvl="2"/>
+            <a:endParaRPr lang="pt-BR" sz="2600" dirty="0" smtClean="0"/>
+          </a:p>
+          <a:p>
+            <a:pPr lvl="1"/>
+            <a:r>
+              <a:rPr lang="pt-BR" sz="2800" dirty="0" smtClean="0"/>
+              <a:t>Priorização de tarefas</a:t>
+            </a:r>
+            <a:endParaRPr lang="pt-BR" sz="2800" dirty="0" smtClean="0"/>
           </a:p>
           <a:p>
             <a:pPr lvl="1"/>
             <a:endParaRPr lang="pt-BR" sz="2800" dirty="0" smtClean="0"/>
           </a:p>
-        </p:txBody>
-      </p:sp>
-      <p:pic>
-        <p:nvPicPr>
-          <p:cNvPr id="9218" name="Picture 2" descr="C:\Users\Administrador\Desktop\burndown1.png"/>
-          <p:cNvPicPr>
-            <a:picLocks noChangeAspect="1" noChangeArrowheads="1"/>
-          </p:cNvPicPr>
-          <p:nvPr/>
-        </p:nvPicPr>
-        <p:blipFill>
-          <a:blip r:embed="rId2"/>
-          <a:srcRect/>
-          <a:stretch>
-            <a:fillRect/>
-          </a:stretch>
-        </p:blipFill>
-        <p:spPr bwMode="auto">
-          <a:xfrm>
-            <a:off x="2697480" y="2939526"/>
-            <a:ext cx="7435871" cy="3463614"/>
-          </a:xfrm>
-          <a:prstGeom prst="rect">
-            <a:avLst/>
-          </a:prstGeom>
-          <a:noFill/>
-        </p:spPr>
-      </p:pic>
+          <a:p>
+            <a:pPr lvl="1"/>
+            <a:endParaRPr lang="pt-BR" sz="2800" dirty="0" smtClean="0"/>
+          </a:p>
+        </p:txBody>
+      </p:sp>
     </p:spTree>
     <p:extLst>
       <p:ext uri="{BB962C8B-B14F-4D97-AF65-F5344CB8AC3E}">
-        <p14:creationId xmlns="" xmlns:p14="http://schemas.microsoft.com/office/powerpoint/2010/main" val="1757591799"/>
+        <p14:creationId xmlns:p14="http://schemas.microsoft.com/office/powerpoint/2010/main" val="1336633060"/>
       </p:ext>
     </p:extLst>
   </p:cSld>
@@ -6419,14 +6402,22 @@
             </a:r>
             <a:r>
               <a:rPr lang="pt-BR" sz="3000" dirty="0" smtClean="0"/>
-              <a:t> 2</a:t>
+              <a:t> 1</a:t>
             </a:r>
           </a:p>
           <a:p>
             <a:pPr lvl="1"/>
             <a:r>
               <a:rPr lang="pt-BR" sz="2800" dirty="0" smtClean="0"/>
-              <a:t>Faltou Design Botões e Trilha sonora.</a:t>
+              <a:t>Faltou </a:t>
+            </a:r>
+            <a:r>
+              <a:rPr lang="pt-BR" sz="2800" dirty="0" err="1" smtClean="0"/>
+              <a:t>Estrátegias</a:t>
+            </a:r>
+            <a:r>
+              <a:rPr lang="pt-BR" sz="2800" dirty="0" smtClean="0"/>
+              <a:t> IA.</a:t>
             </a:r>
           </a:p>
           <a:p>
@@ -6437,7 +6428,7 @@
       </p:sp>
       <p:pic>
         <p:nvPicPr>
-          <p:cNvPr id="10242" name="Picture 2" descr="C:\Users\Administrador\Desktop\burndown2.png"/>
+          <p:cNvPr id="9218" name="Picture 2" descr="C:\Users\Administrador\Desktop\burndown1.png"/>
           <p:cNvPicPr>
             <a:picLocks noChangeAspect="1" noChangeArrowheads="1"/>
           </p:cNvPicPr>
@@ -6452,8 +6443,8 @@
         </p:blipFill>
         <p:spPr bwMode="auto">
           <a:xfrm>
-            <a:off x="2407920" y="2804123"/>
-            <a:ext cx="8315294" cy="3799001"/>
+            <a:off x="2697480" y="2939526"/>
+            <a:ext cx="7435871" cy="3463614"/>
           </a:xfrm>
           <a:prstGeom prst="rect">
             <a:avLst/>
@@ -6464,7 +6455,7 @@
     </p:spTree>
     <p:extLst>
       <p:ext uri="{BB962C8B-B14F-4D97-AF65-F5344CB8AC3E}">
-        <p14:creationId xmlns="" xmlns:p14="http://schemas.microsoft.com/office/powerpoint/2010/main" val="1757591799"/>
+        <p14:creationId xmlns:p14="http://schemas.microsoft.com/office/powerpoint/2010/main" val="1757591799"/>
       </p:ext>
     </p:extLst>
   </p:cSld>
@@ -6562,21 +6553,25 @@
             </a:r>
             <a:r>
               <a:rPr lang="pt-BR" sz="3000" dirty="0" smtClean="0"/>
-              <a:t> 3</a:t>
+              <a:t> 2</a:t>
             </a:r>
           </a:p>
           <a:p>
             <a:pPr lvl="1"/>
             <a:r>
               <a:rPr lang="pt-BR" sz="2800" dirty="0" smtClean="0"/>
-              <a:t>Faltou tempo!</a:t>
-            </a:r>
+              <a:t>Faltou Design Botões e Trilha sonora.</a:t>
+            </a:r>
+          </a:p>
+          <a:p>
+            <a:pPr lvl="1"/>
+            <a:endParaRPr lang="pt-BR" sz="2800" dirty="0" smtClean="0"/>
           </a:p>
         </p:txBody>
       </p:sp>
       <p:pic>
         <p:nvPicPr>
-          <p:cNvPr id="11266" name="Picture 2" descr="C:\Users\Administrador\Desktop\burndown3.png"/>
+          <p:cNvPr id="10242" name="Picture 2" descr="C:\Users\Administrador\Desktop\burndown2.png"/>
           <p:cNvPicPr>
             <a:picLocks noChangeAspect="1" noChangeArrowheads="1"/>
           </p:cNvPicPr>
@@ -6591,8 +6586,8 @@
         </p:blipFill>
         <p:spPr bwMode="auto">
           <a:xfrm>
-            <a:off x="2346033" y="2804160"/>
-            <a:ext cx="7997179" cy="3700960"/>
+            <a:off x="2407920" y="2804123"/>
+            <a:ext cx="8315294" cy="3799001"/>
           </a:xfrm>
           <a:prstGeom prst="rect">
             <a:avLst/>
@@ -6603,7 +6598,7 @@
     </p:spTree>
     <p:extLst>
       <p:ext uri="{BB962C8B-B14F-4D97-AF65-F5344CB8AC3E}">
-        <p14:creationId xmlns="" xmlns:p14="http://schemas.microsoft.com/office/powerpoint/2010/main" val="1757591799"/>
+        <p14:creationId xmlns:p14="http://schemas.microsoft.com/office/powerpoint/2010/main" val="1757591799"/>
       </p:ext>
     </p:extLst>
   </p:cSld>
@@ -6701,25 +6696,21 @@
             </a:r>
             <a:r>
               <a:rPr lang="pt-BR" sz="3000" dirty="0" smtClean="0"/>
-              <a:t> 4</a:t>
+              <a:t> 3</a:t>
             </a:r>
           </a:p>
           <a:p>
             <a:pPr lvl="1"/>
             <a:r>
               <a:rPr lang="pt-BR" sz="2800" dirty="0" smtClean="0"/>
-              <a:t>Tarefas de desenvolvimento</a:t>
-            </a:r>
-          </a:p>
-          <a:p>
-            <a:pPr lvl="1"/>
-            <a:endParaRPr lang="pt-BR" sz="2800" dirty="0" smtClean="0"/>
+              <a:t>Faltou tempo!</a:t>
+            </a:r>
           </a:p>
         </p:txBody>
       </p:sp>
       <p:pic>
         <p:nvPicPr>
-          <p:cNvPr id="12290" name="Picture 2" descr="C:\Users\Administrador\Desktop\burndown4.png"/>
+          <p:cNvPr id="11266" name="Picture 2" descr="C:\Users\Administrador\Desktop\burndown3.png"/>
           <p:cNvPicPr>
             <a:picLocks noChangeAspect="1" noChangeArrowheads="1"/>
           </p:cNvPicPr>
@@ -6734,8 +6725,8 @@
         </p:blipFill>
         <p:spPr bwMode="auto">
           <a:xfrm>
-            <a:off x="2529840" y="2878977"/>
-            <a:ext cx="7828362" cy="3572165"/>
+            <a:off x="2346033" y="2804160"/>
+            <a:ext cx="7997179" cy="3700960"/>
           </a:xfrm>
           <a:prstGeom prst="rect">
             <a:avLst/>
@@ -6746,7 +6737,7 @@
     </p:spTree>
     <p:extLst>
       <p:ext uri="{BB962C8B-B14F-4D97-AF65-F5344CB8AC3E}">
-        <p14:creationId xmlns="" xmlns:p14="http://schemas.microsoft.com/office/powerpoint/2010/main" val="1757591799"/>
+        <p14:creationId xmlns:p14="http://schemas.microsoft.com/office/powerpoint/2010/main" val="1757591799"/>
       </p:ext>
     </p:extLst>
   </p:cSld>
@@ -6844,29 +6835,25 @@
             </a:r>
             <a:r>
               <a:rPr lang="pt-BR" sz="3000" dirty="0" smtClean="0"/>
-              <a:t> 5</a:t>
+              <a:t> 4</a:t>
             </a:r>
           </a:p>
           <a:p>
             <a:pPr lvl="1"/>
             <a:r>
               <a:rPr lang="pt-BR" sz="2800" dirty="0" smtClean="0"/>
-              <a:t>Primeira versão ’’’’’</a:t>
-            </a:r>
-            <a:r>
-              <a:rPr lang="pt-BR" sz="2800" dirty="0" err="1" smtClean="0"/>
-              <a:t>jogável</a:t>
-            </a:r>
-            <a:r>
-              <a:rPr lang="pt-BR" sz="2800" dirty="0" smtClean="0"/>
-              <a:t>’’’’’</a:t>
-            </a:r>
+              <a:t>Tarefas de desenvolvimento</a:t>
+            </a:r>
+          </a:p>
+          <a:p>
+            <a:pPr lvl="1"/>
+            <a:endParaRPr lang="pt-BR" sz="2800" dirty="0" smtClean="0"/>
           </a:p>
         </p:txBody>
       </p:sp>
       <p:pic>
         <p:nvPicPr>
-          <p:cNvPr id="13314" name="Picture 2" descr="C:\Users\Administrador\Desktop\burndown5.png"/>
+          <p:cNvPr id="12290" name="Picture 2" descr="C:\Users\Administrador\Desktop\burndown4.png"/>
           <p:cNvPicPr>
             <a:picLocks noChangeAspect="1" noChangeArrowheads="1"/>
           </p:cNvPicPr>
@@ -6881,8 +6868,8 @@
         </p:blipFill>
         <p:spPr bwMode="auto">
           <a:xfrm>
-            <a:off x="2727959" y="2982246"/>
-            <a:ext cx="7795135" cy="3568552"/>
+            <a:off x="2529840" y="2878977"/>
+            <a:ext cx="7828362" cy="3572165"/>
           </a:xfrm>
           <a:prstGeom prst="rect">
             <a:avLst/>
@@ -6893,7 +6880,7 @@
     </p:spTree>
     <p:extLst>
       <p:ext uri="{BB962C8B-B14F-4D97-AF65-F5344CB8AC3E}">
-        <p14:creationId xmlns="" xmlns:p14="http://schemas.microsoft.com/office/powerpoint/2010/main" val="1757591799"/>
+        <p14:creationId xmlns:p14="http://schemas.microsoft.com/office/powerpoint/2010/main" val="1757591799"/>
       </p:ext>
     </p:extLst>
   </p:cSld>
@@ -6940,7 +6927,7 @@
         <p:spPr>
           <a:xfrm>
             <a:off x="677334" y="609600"/>
-            <a:ext cx="8596668" cy="742682"/>
+            <a:ext cx="8596668" cy="799475"/>
           </a:xfrm>
         </p:spPr>
         <p:txBody>
@@ -6948,8 +6935,16 @@
           <a:lstStyle/>
           <a:p>
             <a:r>
+              <a:rPr lang="pt-BR" dirty="0" err="1" smtClean="0"/>
+              <a:t>Burn</a:t>
+            </a:r>
+            <a:r>
               <a:rPr lang="pt-BR" dirty="0" smtClean="0"/>
-              <a:t>Arquitetura</a:t>
+              <a:t> </a:t>
+            </a:r>
+            <a:r>
+              <a:rPr lang="pt-BR" dirty="0" err="1" smtClean="0"/>
+              <a:t>Down</a:t>
             </a:r>
             <a:endParaRPr lang="pt-BR" dirty="0"/>
           </a:p>
@@ -6967,49 +6962,85 @@
         </p:nvSpPr>
         <p:spPr>
           <a:xfrm>
-            <a:off x="707314" y="1571856"/>
-            <a:ext cx="8596668" cy="4199683"/>
+            <a:off x="677334" y="1622738"/>
+            <a:ext cx="9216174" cy="5125792"/>
           </a:xfrm>
         </p:spPr>
         <p:txBody>
-          <a:bodyPr/>
-          <a:lstStyle/>
-          <a:p>
-            <a:r>
-              <a:rPr lang="pt-BR" sz="3000" dirty="0" smtClean="0">
-                <a:solidFill>
-                  <a:srgbClr val="FF0000"/>
-                </a:solidFill>
-              </a:rPr>
-              <a:t>Diagrama UML</a:t>
-            </a:r>
-            <a:endParaRPr lang="pt-BR" sz="3000" dirty="0" smtClean="0">
-              <a:solidFill>
-                <a:srgbClr val="FF0000"/>
-              </a:solidFill>
-            </a:endParaRPr>
-          </a:p>
-          <a:p>
-            <a:endParaRPr lang="pt-BR" dirty="0"/>
-          </a:p>
-          <a:p>
-            <a:pPr marL="0" indent="0">
-              <a:buNone/>
-            </a:pPr>
-            <a:endParaRPr lang="pt-BR" dirty="0"/>
-          </a:p>
-        </p:txBody>
-      </p:sp>
+          <a:bodyPr>
+            <a:normAutofit/>
+          </a:bodyPr>
+          <a:lstStyle/>
+          <a:p>
+            <a:r>
+              <a:rPr lang="pt-BR" sz="3000" dirty="0" err="1" smtClean="0"/>
+              <a:t>Sprint</a:t>
+            </a:r>
+            <a:r>
+              <a:rPr lang="pt-BR" sz="3000" dirty="0" smtClean="0"/>
+              <a:t> 5</a:t>
+            </a:r>
+          </a:p>
+          <a:p>
+            <a:pPr lvl="1"/>
+            <a:r>
+              <a:rPr lang="pt-BR" sz="2800" dirty="0" smtClean="0"/>
+              <a:t>Primeira versão ’’’’’</a:t>
+            </a:r>
+            <a:r>
+              <a:rPr lang="pt-BR" sz="2800" dirty="0" err="1" smtClean="0"/>
+              <a:t>jogável</a:t>
+            </a:r>
+            <a:r>
+              <a:rPr lang="pt-BR" sz="2800" dirty="0" smtClean="0"/>
+              <a:t>’’’’’</a:t>
+            </a:r>
+          </a:p>
+        </p:txBody>
+      </p:sp>
+      <p:pic>
+        <p:nvPicPr>
+          <p:cNvPr id="13314" name="Picture 2" descr="C:\Users\Administrador\Desktop\burndown5.png"/>
+          <p:cNvPicPr>
+            <a:picLocks noChangeAspect="1" noChangeArrowheads="1"/>
+          </p:cNvPicPr>
+          <p:nvPr/>
+        </p:nvPicPr>
+        <p:blipFill>
+          <a:blip r:embed="rId2"/>
+          <a:srcRect/>
+          <a:stretch>
+            <a:fillRect/>
+          </a:stretch>
+        </p:blipFill>
+        <p:spPr bwMode="auto">
+          <a:xfrm>
+            <a:off x="2727959" y="2982246"/>
+            <a:ext cx="7795135" cy="3568552"/>
+          </a:xfrm>
+          <a:prstGeom prst="rect">
+            <a:avLst/>
+          </a:prstGeom>
+          <a:noFill/>
+        </p:spPr>
+      </p:pic>
     </p:spTree>
     <p:extLst>
       <p:ext uri="{BB962C8B-B14F-4D97-AF65-F5344CB8AC3E}">
-        <p14:creationId xmlns="" xmlns:p14="http://schemas.microsoft.com/office/powerpoint/2010/main" val="1495886700"/>
+        <p14:creationId xmlns:p14="http://schemas.microsoft.com/office/powerpoint/2010/main" val="1757591799"/>
       </p:ext>
     </p:extLst>
   </p:cSld>
   <p:clrMapOvr>
     <a:masterClrMapping/>
   </p:clrMapOvr>
+  <p:timing>
+    <p:tnLst>
+      <p:par>
+        <p:cTn id="1" dur="indefinite" restart="never" nodeType="tmRoot"/>
+      </p:par>
+    </p:tnLst>
+  </p:timing>
 </p:sld>
 </file>
 
@@ -7040,6 +7071,104 @@
             <p:ph type="title"/>
           </p:nvPr>
         </p:nvSpPr>
+        <p:spPr>
+          <a:xfrm>
+            <a:off x="677334" y="609600"/>
+            <a:ext cx="8596668" cy="742682"/>
+          </a:xfrm>
+        </p:spPr>
+        <p:txBody>
+          <a:bodyPr/>
+          <a:lstStyle/>
+          <a:p>
+            <a:r>
+              <a:rPr lang="pt-BR" dirty="0" smtClean="0"/>
+              <a:t>Arquitetura</a:t>
+            </a:r>
+            <a:endParaRPr lang="pt-BR" dirty="0"/>
+          </a:p>
+        </p:txBody>
+      </p:sp>
+      <p:sp>
+        <p:nvSpPr>
+          <p:cNvPr id="3" name="Espaço Reservado para Conteúdo 2"/>
+          <p:cNvSpPr>
+            <a:spLocks noGrp="1"/>
+          </p:cNvSpPr>
+          <p:nvPr>
+            <p:ph idx="1"/>
+          </p:nvPr>
+        </p:nvSpPr>
+        <p:spPr>
+          <a:xfrm>
+            <a:off x="707314" y="1571856"/>
+            <a:ext cx="8596668" cy="4199683"/>
+          </a:xfrm>
+        </p:spPr>
+        <p:txBody>
+          <a:bodyPr/>
+          <a:lstStyle/>
+          <a:p>
+            <a:r>
+              <a:rPr lang="pt-BR" sz="3000" dirty="0" smtClean="0">
+                <a:solidFill>
+                  <a:srgbClr val="FF0000"/>
+                </a:solidFill>
+              </a:rPr>
+              <a:t>Diagrama UML</a:t>
+            </a:r>
+          </a:p>
+          <a:p>
+            <a:endParaRPr lang="pt-BR" dirty="0"/>
+          </a:p>
+          <a:p>
+            <a:pPr marL="0" indent="0">
+              <a:buNone/>
+            </a:pPr>
+            <a:endParaRPr lang="pt-BR" dirty="0"/>
+          </a:p>
+        </p:txBody>
+      </p:sp>
+    </p:spTree>
+    <p:extLst>
+      <p:ext uri="{BB962C8B-B14F-4D97-AF65-F5344CB8AC3E}">
+        <p14:creationId xmlns:p14="http://schemas.microsoft.com/office/powerpoint/2010/main" val="1495886700"/>
+      </p:ext>
+    </p:extLst>
+  </p:cSld>
+  <p:clrMapOvr>
+    <a:masterClrMapping/>
+  </p:clrMapOvr>
+</p:sld>
+</file>
+
+<file path=ppt/slides/slide19.xml><?xml version="1.0" encoding="utf-8"?>
+<p:sld xmlns:a="http://schemas.openxmlformats.org/drawingml/2006/main" xmlns:r="http://schemas.openxmlformats.org/officeDocument/2006/relationships" xmlns:p="http://schemas.openxmlformats.org/presentationml/2006/main">
+  <p:cSld>
+    <p:spTree>
+      <p:nvGrpSpPr>
+        <p:cNvPr id="1" name=""/>
+        <p:cNvGrpSpPr/>
+        <p:nvPr/>
+      </p:nvGrpSpPr>
+      <p:grpSpPr>
+        <a:xfrm>
+          <a:off x="0" y="0"/>
+          <a:ext cx="0" cy="0"/>
+          <a:chOff x="0" y="0"/>
+          <a:chExt cx="0" cy="0"/>
+        </a:xfrm>
+      </p:grpSpPr>
+      <p:sp>
+        <p:nvSpPr>
+          <p:cNvPr id="2" name="Título 1"/>
+          <p:cNvSpPr>
+            <a:spLocks noGrp="1"/>
+          </p:cNvSpPr>
+          <p:nvPr>
+            <p:ph type="title"/>
+          </p:nvPr>
+        </p:nvSpPr>
         <p:spPr/>
         <p:txBody>
           <a:bodyPr/>
@@ -7079,7 +7208,6 @@
               <a:rPr lang="pt-BR" sz="3000" dirty="0" smtClean="0"/>
               <a:t>Projeto</a:t>
             </a:r>
-            <a:endParaRPr lang="pt-BR" sz="3000" dirty="0" smtClean="0"/>
           </a:p>
           <a:p>
             <a:endParaRPr lang="pt-BR" sz="3000" dirty="0"/>
@@ -7122,93 +7250,7 @@
     </p:spTree>
     <p:extLst>
       <p:ext uri="{BB962C8B-B14F-4D97-AF65-F5344CB8AC3E}">
-        <p14:creationId xmlns="" xmlns:p14="http://schemas.microsoft.com/office/powerpoint/2010/main" val="1552501939"/>
-      </p:ext>
-    </p:extLst>
-  </p:cSld>
-  <p:clrMapOvr>
-    <a:masterClrMapping/>
-  </p:clrMapOvr>
-</p:sld>
-</file>
-
-<file path=ppt/slides/slide19.xml><?xml version="1.0" encoding="utf-8"?>
-<p:sld xmlns:a="http://schemas.openxmlformats.org/drawingml/2006/main" xmlns:r="http://schemas.openxmlformats.org/officeDocument/2006/relationships" xmlns:p="http://schemas.openxmlformats.org/presentationml/2006/main">
-  <p:cSld>
-    <p:spTree>
-      <p:nvGrpSpPr>
-        <p:cNvPr id="1" name=""/>
-        <p:cNvGrpSpPr/>
-        <p:nvPr/>
-      </p:nvGrpSpPr>
-      <p:grpSpPr>
-        <a:xfrm>
-          <a:off x="0" y="0"/>
-          <a:ext cx="0" cy="0"/>
-          <a:chOff x="0" y="0"/>
-          <a:chExt cx="0" cy="0"/>
-        </a:xfrm>
-      </p:grpSpPr>
-      <p:sp>
-        <p:nvSpPr>
-          <p:cNvPr id="2" name="Título 1"/>
-          <p:cNvSpPr>
-            <a:spLocks noGrp="1"/>
-          </p:cNvSpPr>
-          <p:nvPr>
-            <p:ph type="title"/>
-          </p:nvPr>
-        </p:nvSpPr>
-        <p:spPr/>
-        <p:txBody>
-          <a:bodyPr/>
-          <a:lstStyle/>
-          <a:p>
-            <a:r>
-              <a:rPr lang="pt-BR" dirty="0" smtClean="0"/>
-              <a:t>Versão Parcial</a:t>
-            </a:r>
-            <a:endParaRPr lang="pt-BR" dirty="0"/>
-          </a:p>
-        </p:txBody>
-      </p:sp>
-      <p:sp>
-        <p:nvSpPr>
-          <p:cNvPr id="3" name="Espaço Reservado para Conteúdo 2"/>
-          <p:cNvSpPr>
-            <a:spLocks noGrp="1"/>
-          </p:cNvSpPr>
-          <p:nvPr>
-            <p:ph idx="1"/>
-          </p:nvPr>
-        </p:nvSpPr>
-        <p:spPr>
-          <a:xfrm>
-            <a:off x="677334" y="1619677"/>
-            <a:ext cx="8596668" cy="3880773"/>
-          </a:xfrm>
-        </p:spPr>
-        <p:txBody>
-          <a:bodyPr>
-            <a:normAutofit/>
-          </a:bodyPr>
-          <a:lstStyle/>
-          <a:p>
-            <a:r>
-              <a:rPr lang="pt-BR" sz="3000" dirty="0" smtClean="0"/>
-              <a:t>Exibição</a:t>
-            </a:r>
-            <a:endParaRPr lang="pt-BR" sz="3000" dirty="0" smtClean="0"/>
-          </a:p>
-          <a:p>
-            <a:endParaRPr lang="pt-BR" sz="3000" dirty="0"/>
-          </a:p>
-        </p:txBody>
-      </p:sp>
-    </p:spTree>
-    <p:extLst>
-      <p:ext uri="{BB962C8B-B14F-4D97-AF65-F5344CB8AC3E}">
-        <p14:creationId xmlns="" xmlns:p14="http://schemas.microsoft.com/office/powerpoint/2010/main" val="1552501939"/>
+        <p14:creationId xmlns:p14="http://schemas.microsoft.com/office/powerpoint/2010/main" val="1552501939"/>
       </p:ext>
     </p:extLst>
   </p:cSld>
@@ -7313,7 +7355,6 @@
               <a:rPr lang="pt-BR" sz="2200" dirty="0" smtClean="0"/>
               <a:t>;</a:t>
             </a:r>
-            <a:endParaRPr lang="pt-BR" sz="2200" dirty="0" smtClean="0"/>
           </a:p>
           <a:p>
             <a:r>
@@ -7336,21 +7377,19 @@
               <a:rPr lang="pt-BR" sz="2200" dirty="0" smtClean="0"/>
               <a:t>Diagrama UML;</a:t>
             </a:r>
-            <a:endParaRPr lang="pt-BR" sz="2200" dirty="0" smtClean="0"/>
           </a:p>
           <a:p>
             <a:r>
               <a:rPr lang="pt-BR" sz="2200" dirty="0" smtClean="0"/>
               <a:t>Versão Parcial.</a:t>
             </a:r>
-            <a:endParaRPr lang="pt-BR" sz="2200" dirty="0" smtClean="0"/>
           </a:p>
         </p:txBody>
       </p:sp>
     </p:spTree>
     <p:extLst>
       <p:ext uri="{BB962C8B-B14F-4D97-AF65-F5344CB8AC3E}">
-        <p14:creationId xmlns="" xmlns:p14="http://schemas.microsoft.com/office/powerpoint/2010/main" val="1234029532"/>
+        <p14:creationId xmlns:p14="http://schemas.microsoft.com/office/powerpoint/2010/main" val="1234029532"/>
       </p:ext>
     </p:extLst>
   </p:cSld>
@@ -7392,6 +7431,91 @@
           <a:bodyPr/>
           <a:lstStyle/>
           <a:p>
+            <a:r>
+              <a:rPr lang="pt-BR" dirty="0" smtClean="0"/>
+              <a:t>Versão Parcial</a:t>
+            </a:r>
+            <a:endParaRPr lang="pt-BR" dirty="0"/>
+          </a:p>
+        </p:txBody>
+      </p:sp>
+      <p:sp>
+        <p:nvSpPr>
+          <p:cNvPr id="3" name="Espaço Reservado para Conteúdo 2"/>
+          <p:cNvSpPr>
+            <a:spLocks noGrp="1"/>
+          </p:cNvSpPr>
+          <p:nvPr>
+            <p:ph idx="1"/>
+          </p:nvPr>
+        </p:nvSpPr>
+        <p:spPr>
+          <a:xfrm>
+            <a:off x="677334" y="1619677"/>
+            <a:ext cx="8596668" cy="3880773"/>
+          </a:xfrm>
+        </p:spPr>
+        <p:txBody>
+          <a:bodyPr>
+            <a:normAutofit/>
+          </a:bodyPr>
+          <a:lstStyle/>
+          <a:p>
+            <a:r>
+              <a:rPr lang="pt-BR" sz="3000" dirty="0" smtClean="0"/>
+              <a:t>Exibição</a:t>
+            </a:r>
+          </a:p>
+          <a:p>
+            <a:endParaRPr lang="pt-BR" sz="3000" dirty="0"/>
+          </a:p>
+        </p:txBody>
+      </p:sp>
+    </p:spTree>
+    <p:extLst>
+      <p:ext uri="{BB962C8B-B14F-4D97-AF65-F5344CB8AC3E}">
+        <p14:creationId xmlns:p14="http://schemas.microsoft.com/office/powerpoint/2010/main" val="1552501939"/>
+      </p:ext>
+    </p:extLst>
+  </p:cSld>
+  <p:clrMapOvr>
+    <a:masterClrMapping/>
+  </p:clrMapOvr>
+</p:sld>
+</file>
+
+<file path=ppt/slides/slide21.xml><?xml version="1.0" encoding="utf-8"?>
+<p:sld xmlns:a="http://schemas.openxmlformats.org/drawingml/2006/main" xmlns:r="http://schemas.openxmlformats.org/officeDocument/2006/relationships" xmlns:p="http://schemas.openxmlformats.org/presentationml/2006/main">
+  <p:cSld>
+    <p:spTree>
+      <p:nvGrpSpPr>
+        <p:cNvPr id="1" name=""/>
+        <p:cNvGrpSpPr/>
+        <p:nvPr/>
+      </p:nvGrpSpPr>
+      <p:grpSpPr>
+        <a:xfrm>
+          <a:off x="0" y="0"/>
+          <a:ext cx="0" cy="0"/>
+          <a:chOff x="0" y="0"/>
+          <a:chExt cx="0" cy="0"/>
+        </a:xfrm>
+      </p:grpSpPr>
+      <p:sp>
+        <p:nvSpPr>
+          <p:cNvPr id="2" name="Título 1"/>
+          <p:cNvSpPr>
+            <a:spLocks noGrp="1"/>
+          </p:cNvSpPr>
+          <p:nvPr>
+            <p:ph type="title"/>
+          </p:nvPr>
+        </p:nvSpPr>
+        <p:spPr/>
+        <p:txBody>
+          <a:bodyPr/>
+          <a:lstStyle/>
+          <a:p>
             <a:pPr algn="ctr"/>
             <a:r>
               <a:rPr lang="pt-BR" dirty="0" smtClean="0"/>
@@ -7411,7 +7535,7 @@
     </p:spTree>
     <p:extLst>
       <p:ext uri="{BB962C8B-B14F-4D97-AF65-F5344CB8AC3E}">
-        <p14:creationId xmlns="" xmlns:p14="http://schemas.microsoft.com/office/powerpoint/2010/main" val="3523226625"/>
+        <p14:creationId xmlns:p14="http://schemas.microsoft.com/office/powerpoint/2010/main" val="3523226625"/>
       </p:ext>
     </p:extLst>
   </p:cSld>
@@ -7506,7 +7630,7 @@
     </p:spTree>
     <p:extLst>
       <p:ext uri="{BB962C8B-B14F-4D97-AF65-F5344CB8AC3E}">
-        <p14:creationId xmlns="" xmlns:p14="http://schemas.microsoft.com/office/powerpoint/2010/main" val="2414516442"/>
+        <p14:creationId xmlns:p14="http://schemas.microsoft.com/office/powerpoint/2010/main" val="2414516442"/>
       </p:ext>
     </p:extLst>
   </p:cSld>
@@ -7550,11 +7674,7 @@
           <a:p>
             <a:r>
               <a:rPr lang="pt-BR" dirty="0" smtClean="0"/>
-              <a:t>Tema </a:t>
-            </a:r>
-            <a:r>
-              <a:rPr lang="pt-BR" dirty="0" smtClean="0"/>
-              <a:t>Escolhido - Mapa</a:t>
+              <a:t>Tema Escolhido - Mapa</a:t>
             </a:r>
             <a:endParaRPr lang="pt-BR" dirty="0"/>
           </a:p>
@@ -7608,7 +7728,7 @@
     </p:spTree>
     <p:extLst>
       <p:ext uri="{BB962C8B-B14F-4D97-AF65-F5344CB8AC3E}">
-        <p14:creationId xmlns="" xmlns:p14="http://schemas.microsoft.com/office/powerpoint/2010/main" val="2414516442"/>
+        <p14:creationId xmlns:p14="http://schemas.microsoft.com/office/powerpoint/2010/main" val="2414516442"/>
       </p:ext>
     </p:extLst>
   </p:cSld>
@@ -7720,7 +7840,7 @@
     </p:spTree>
     <p:extLst>
       <p:ext uri="{BB962C8B-B14F-4D97-AF65-F5344CB8AC3E}">
-        <p14:creationId xmlns="" xmlns:p14="http://schemas.microsoft.com/office/powerpoint/2010/main" val="667203657"/>
+        <p14:creationId xmlns:p14="http://schemas.microsoft.com/office/powerpoint/2010/main" val="667203657"/>
       </p:ext>
     </p:extLst>
   </p:cSld>
@@ -7822,7 +7942,7 @@
     </p:spTree>
     <p:extLst>
       <p:ext uri="{BB962C8B-B14F-4D97-AF65-F5344CB8AC3E}">
-        <p14:creationId xmlns="" xmlns:p14="http://schemas.microsoft.com/office/powerpoint/2010/main" val="667203657"/>
+        <p14:creationId xmlns:p14="http://schemas.microsoft.com/office/powerpoint/2010/main" val="667203657"/>
       </p:ext>
     </p:extLst>
   </p:cSld>
@@ -7948,7 +8068,7 @@
     </p:spTree>
     <p:extLst>
       <p:ext uri="{BB962C8B-B14F-4D97-AF65-F5344CB8AC3E}">
-        <p14:creationId xmlns="" xmlns:p14="http://schemas.microsoft.com/office/powerpoint/2010/main" val="667203657"/>
+        <p14:creationId xmlns:p14="http://schemas.microsoft.com/office/powerpoint/2010/main" val="667203657"/>
       </p:ext>
     </p:extLst>
   </p:cSld>
@@ -8075,7 +8195,7 @@
     </p:spTree>
     <p:extLst>
       <p:ext uri="{BB962C8B-B14F-4D97-AF65-F5344CB8AC3E}">
-        <p14:creationId xmlns="" xmlns:p14="http://schemas.microsoft.com/office/powerpoint/2010/main" val="667203657"/>
+        <p14:creationId xmlns:p14="http://schemas.microsoft.com/office/powerpoint/2010/main" val="667203657"/>
       </p:ext>
     </p:extLst>
   </p:cSld>
@@ -8139,11 +8259,7 @@
             </a:r>
             <a:r>
               <a:rPr lang="pt-BR" dirty="0" err="1" smtClean="0"/>
-              <a:t>E</a:t>
-            </a:r>
-            <a:r>
-              <a:rPr lang="pt-BR" dirty="0" err="1" smtClean="0"/>
-              <a:t>Git</a:t>
+              <a:t>EGit</a:t>
             </a:r>
             <a:endParaRPr lang="pt-BR" dirty="0"/>
           </a:p>
@@ -8218,7 +8334,7 @@
     </p:spTree>
     <p:extLst>
       <p:ext uri="{BB962C8B-B14F-4D97-AF65-F5344CB8AC3E}">
-        <p14:creationId xmlns="" xmlns:p14="http://schemas.microsoft.com/office/powerpoint/2010/main" val="667203657"/>
+        <p14:creationId xmlns:p14="http://schemas.microsoft.com/office/powerpoint/2010/main" val="667203657"/>
       </p:ext>
     </p:extLst>
   </p:cSld>
@@ -8486,7 +8602,7 @@
   <a:extraClrSchemeLst/>
   <a:extLst>
     <a:ext uri="{05A4C25C-085E-4340-85A3-A5531E510DB2}">
-      <thm15:themeFamily xmlns="" xmlns:thm15="http://schemas.microsoft.com/office/thememl/2012/main" name="Facet" id="{C0C680CD-088A-49FC-A102-D699147F32B2}" vid="{CFBC31BA-B70F-4F30-BCAA-4F3011E16C4D}"/>
+      <thm15:themeFamily xmlns:thm15="http://schemas.microsoft.com/office/thememl/2012/main" name="Facet" id="{C0C680CD-088A-49FC-A102-D699147F32B2}" vid="{CFBC31BA-B70F-4F30-BCAA-4F3011E16C4D}"/>
     </a:ext>
   </a:extLst>
 </a:theme>

</xml_diff>